<commit_message>
addition after reviewer 3 comments
</commit_message>
<xml_diff>
--- a/Images/Needles.pptx
+++ b/Images/Needles.pptx
@@ -105,7 +105,96 @@
       </a:defRPr>
     </a:lvl9pPr>
   </p:defaultTextStyle>
+  <p:extLst>
+    <p:ext uri="{EFAFB233-063F-42B5-8137-9DF3F51BA10A}">
+      <p15:sldGuideLst xmlns:p15="http://schemas.microsoft.com/office/powerpoint/2012/main"/>
+    </p:ext>
+  </p:extLst>
 </p:presentation>
+</file>
+
+<file path=ppt/changesInfos/changesInfo1.xml><?xml version="1.0" encoding="utf-8"?>
+<pc:chgInfo xmlns:a="http://schemas.openxmlformats.org/drawingml/2006/main" xmlns:r="http://schemas.openxmlformats.org/officeDocument/2006/relationships" xmlns:ac="http://schemas.microsoft.com/office/drawing/2013/main/command" xmlns:pc="http://schemas.microsoft.com/office/powerpoint/2013/main/command">
+  <pc:docChgLst>
+    <pc:chgData name="Nikhil Kotibhaskar" userId="ae3badbd-7aaf-41d7-bf37-a015832cbfa1" providerId="ADAL" clId="{93CF8FBF-D9EC-4FFF-B517-E591144241EB}"/>
+    <pc:docChg chg="undo custSel modSld">
+      <pc:chgData name="Nikhil Kotibhaskar" userId="ae3badbd-7aaf-41d7-bf37-a015832cbfa1" providerId="ADAL" clId="{93CF8FBF-D9EC-4FFF-B517-E591144241EB}" dt="2023-02-22T21:22:59.345" v="15" actId="1076"/>
+      <pc:docMkLst>
+        <pc:docMk/>
+      </pc:docMkLst>
+      <pc:sldChg chg="modSp mod">
+        <pc:chgData name="Nikhil Kotibhaskar" userId="ae3badbd-7aaf-41d7-bf37-a015832cbfa1" providerId="ADAL" clId="{93CF8FBF-D9EC-4FFF-B517-E591144241EB}" dt="2023-02-22T21:20:15.069" v="5" actId="207"/>
+        <pc:sldMkLst>
+          <pc:docMk/>
+          <pc:sldMk cId="3213916321" sldId="256"/>
+        </pc:sldMkLst>
+        <pc:spChg chg="mod">
+          <ac:chgData name="Nikhil Kotibhaskar" userId="ae3badbd-7aaf-41d7-bf37-a015832cbfa1" providerId="ADAL" clId="{93CF8FBF-D9EC-4FFF-B517-E591144241EB}" dt="2023-02-22T21:19:55.381" v="3" actId="207"/>
+          <ac:spMkLst>
+            <pc:docMk/>
+            <pc:sldMk cId="3213916321" sldId="256"/>
+            <ac:spMk id="6" creationId="{6E3E077C-88CF-49A0-F7A6-4959B53CEE71}"/>
+          </ac:spMkLst>
+        </pc:spChg>
+        <pc:spChg chg="mod">
+          <ac:chgData name="Nikhil Kotibhaskar" userId="ae3badbd-7aaf-41d7-bf37-a015832cbfa1" providerId="ADAL" clId="{93CF8FBF-D9EC-4FFF-B517-E591144241EB}" dt="2023-02-22T21:20:06.531" v="4" actId="207"/>
+          <ac:spMkLst>
+            <pc:docMk/>
+            <pc:sldMk cId="3213916321" sldId="256"/>
+            <ac:spMk id="7" creationId="{D0F0008D-43DD-7761-8B90-15574EF388BA}"/>
+          </ac:spMkLst>
+        </pc:spChg>
+        <pc:spChg chg="mod">
+          <ac:chgData name="Nikhil Kotibhaskar" userId="ae3badbd-7aaf-41d7-bf37-a015832cbfa1" providerId="ADAL" clId="{93CF8FBF-D9EC-4FFF-B517-E591144241EB}" dt="2023-02-22T21:20:15.069" v="5" actId="207"/>
+          <ac:spMkLst>
+            <pc:docMk/>
+            <pc:sldMk cId="3213916321" sldId="256"/>
+            <ac:spMk id="8" creationId="{1C0254E9-6ED3-0A1B-6A88-F5A7FD24711E}"/>
+          </ac:spMkLst>
+        </pc:spChg>
+      </pc:sldChg>
+      <pc:sldChg chg="modSp mod">
+        <pc:chgData name="Nikhil Kotibhaskar" userId="ae3badbd-7aaf-41d7-bf37-a015832cbfa1" providerId="ADAL" clId="{93CF8FBF-D9EC-4FFF-B517-E591144241EB}" dt="2023-02-22T21:22:59.345" v="15" actId="1076"/>
+        <pc:sldMkLst>
+          <pc:docMk/>
+          <pc:sldMk cId="2140354690" sldId="257"/>
+        </pc:sldMkLst>
+        <pc:spChg chg="mod">
+          <ac:chgData name="Nikhil Kotibhaskar" userId="ae3badbd-7aaf-41d7-bf37-a015832cbfa1" providerId="ADAL" clId="{93CF8FBF-D9EC-4FFF-B517-E591144241EB}" dt="2023-02-22T21:21:35.709" v="9" actId="207"/>
+          <ac:spMkLst>
+            <pc:docMk/>
+            <pc:sldMk cId="2140354690" sldId="257"/>
+            <ac:spMk id="6" creationId="{494F113A-DDE0-A1C3-BADD-B97405F69249}"/>
+          </ac:spMkLst>
+        </pc:spChg>
+        <pc:spChg chg="mod">
+          <ac:chgData name="Nikhil Kotibhaskar" userId="ae3badbd-7aaf-41d7-bf37-a015832cbfa1" providerId="ADAL" clId="{93CF8FBF-D9EC-4FFF-B517-E591144241EB}" dt="2023-02-22T21:21:45.413" v="10" actId="207"/>
+          <ac:spMkLst>
+            <pc:docMk/>
+            <pc:sldMk cId="2140354690" sldId="257"/>
+            <ac:spMk id="7" creationId="{1414CA01-352A-F7EE-1B19-755ED53BFD86}"/>
+          </ac:spMkLst>
+        </pc:spChg>
+        <pc:spChg chg="mod">
+          <ac:chgData name="Nikhil Kotibhaskar" userId="ae3badbd-7aaf-41d7-bf37-a015832cbfa1" providerId="ADAL" clId="{93CF8FBF-D9EC-4FFF-B517-E591144241EB}" dt="2023-02-22T21:22:59.345" v="15" actId="1076"/>
+          <ac:spMkLst>
+            <pc:docMk/>
+            <pc:sldMk cId="2140354690" sldId="257"/>
+            <ac:spMk id="8" creationId="{D9129ACC-A9E7-4C7D-624C-DE52A58B8971}"/>
+          </ac:spMkLst>
+        </pc:spChg>
+        <pc:picChg chg="mod">
+          <ac:chgData name="Nikhil Kotibhaskar" userId="ae3badbd-7aaf-41d7-bf37-a015832cbfa1" providerId="ADAL" clId="{93CF8FBF-D9EC-4FFF-B517-E591144241EB}" dt="2023-02-22T21:22:52.907" v="14" actId="1076"/>
+          <ac:picMkLst>
+            <pc:docMk/>
+            <pc:sldMk cId="2140354690" sldId="257"/>
+            <ac:picMk id="5" creationId="{50B24D60-E243-0517-725B-4CF2403AE0C0}"/>
+          </ac:picMkLst>
+        </pc:picChg>
+      </pc:sldChg>
+    </pc:docChg>
+  </pc:docChgLst>
+</pc:chgInfo>
 </file>
 
 <file path=ppt/slideLayouts/slideLayout1.xml><?xml version="1.0" encoding="utf-8"?>
@@ -257,7 +346,7 @@
           <a:p>
             <a:fld id="{4E428A86-3EAA-4082-B3EF-7CD503E0AC24}" type="datetimeFigureOut">
               <a:rPr lang="en-CA" smtClean="0"/>
-              <a:t>2022-08-25</a:t>
+              <a:t>2023-02-22</a:t>
             </a:fld>
             <a:endParaRPr lang="en-CA"/>
           </a:p>
@@ -457,7 +546,7 @@
           <a:p>
             <a:fld id="{4E428A86-3EAA-4082-B3EF-7CD503E0AC24}" type="datetimeFigureOut">
               <a:rPr lang="en-CA" smtClean="0"/>
-              <a:t>2022-08-25</a:t>
+              <a:t>2023-02-22</a:t>
             </a:fld>
             <a:endParaRPr lang="en-CA"/>
           </a:p>
@@ -667,7 +756,7 @@
           <a:p>
             <a:fld id="{4E428A86-3EAA-4082-B3EF-7CD503E0AC24}" type="datetimeFigureOut">
               <a:rPr lang="en-CA" smtClean="0"/>
-              <a:t>2022-08-25</a:t>
+              <a:t>2023-02-22</a:t>
             </a:fld>
             <a:endParaRPr lang="en-CA"/>
           </a:p>
@@ -867,7 +956,7 @@
           <a:p>
             <a:fld id="{4E428A86-3EAA-4082-B3EF-7CD503E0AC24}" type="datetimeFigureOut">
               <a:rPr lang="en-CA" smtClean="0"/>
-              <a:t>2022-08-25</a:t>
+              <a:t>2023-02-22</a:t>
             </a:fld>
             <a:endParaRPr lang="en-CA"/>
           </a:p>
@@ -1143,7 +1232,7 @@
           <a:p>
             <a:fld id="{4E428A86-3EAA-4082-B3EF-7CD503E0AC24}" type="datetimeFigureOut">
               <a:rPr lang="en-CA" smtClean="0"/>
-              <a:t>2022-08-25</a:t>
+              <a:t>2023-02-22</a:t>
             </a:fld>
             <a:endParaRPr lang="en-CA"/>
           </a:p>
@@ -1411,7 +1500,7 @@
           <a:p>
             <a:fld id="{4E428A86-3EAA-4082-B3EF-7CD503E0AC24}" type="datetimeFigureOut">
               <a:rPr lang="en-CA" smtClean="0"/>
-              <a:t>2022-08-25</a:t>
+              <a:t>2023-02-22</a:t>
             </a:fld>
             <a:endParaRPr lang="en-CA"/>
           </a:p>
@@ -1826,7 +1915,7 @@
           <a:p>
             <a:fld id="{4E428A86-3EAA-4082-B3EF-7CD503E0AC24}" type="datetimeFigureOut">
               <a:rPr lang="en-CA" smtClean="0"/>
-              <a:t>2022-08-25</a:t>
+              <a:t>2023-02-22</a:t>
             </a:fld>
             <a:endParaRPr lang="en-CA"/>
           </a:p>
@@ -1968,7 +2057,7 @@
           <a:p>
             <a:fld id="{4E428A86-3EAA-4082-B3EF-7CD503E0AC24}" type="datetimeFigureOut">
               <a:rPr lang="en-CA" smtClean="0"/>
-              <a:t>2022-08-25</a:t>
+              <a:t>2023-02-22</a:t>
             </a:fld>
             <a:endParaRPr lang="en-CA"/>
           </a:p>
@@ -2081,7 +2170,7 @@
           <a:p>
             <a:fld id="{4E428A86-3EAA-4082-B3EF-7CD503E0AC24}" type="datetimeFigureOut">
               <a:rPr lang="en-CA" smtClean="0"/>
-              <a:t>2022-08-25</a:t>
+              <a:t>2023-02-22</a:t>
             </a:fld>
             <a:endParaRPr lang="en-CA"/>
           </a:p>
@@ -2394,7 +2483,7 @@
           <a:p>
             <a:fld id="{4E428A86-3EAA-4082-B3EF-7CD503E0AC24}" type="datetimeFigureOut">
               <a:rPr lang="en-CA" smtClean="0"/>
-              <a:t>2022-08-25</a:t>
+              <a:t>2023-02-22</a:t>
             </a:fld>
             <a:endParaRPr lang="en-CA"/>
           </a:p>
@@ -2683,7 +2772,7 @@
           <a:p>
             <a:fld id="{4E428A86-3EAA-4082-B3EF-7CD503E0AC24}" type="datetimeFigureOut">
               <a:rPr lang="en-CA" smtClean="0"/>
-              <a:t>2022-08-25</a:t>
+              <a:t>2023-02-22</a:t>
             </a:fld>
             <a:endParaRPr lang="en-CA"/>
           </a:p>
@@ -2926,7 +3015,7 @@
           <a:p>
             <a:fld id="{4E428A86-3EAA-4082-B3EF-7CD503E0AC24}" type="datetimeFigureOut">
               <a:rPr lang="en-CA" smtClean="0"/>
-              <a:t>2022-08-25</a:t>
+              <a:t>2023-02-22</a:t>
             </a:fld>
             <a:endParaRPr lang="en-CA"/>
           </a:p>
@@ -3400,7 +3489,9 @@
             <a:avLst/>
           </a:prstGeom>
           <a:solidFill>
-            <a:srgbClr val="BC1921"/>
+            <a:schemeClr val="bg1">
+              <a:lumMod val="95000"/>
+            </a:schemeClr>
           </a:solidFill>
         </p:spPr>
         <p:txBody>
@@ -3410,20 +3501,28 @@
           <a:lstStyle/>
           <a:p>
             <a:r>
-              <a:rPr lang="en-CA" sz="1200" dirty="0"/>
+              <a:rPr lang="en-CA" sz="1200" dirty="0">
+                <a:solidFill>
+                  <a:srgbClr val="FF0000"/>
+                </a:solidFill>
+              </a:rPr>
               <a:t>Length:349.90 </a:t>
             </a:r>
             <a:r>
               <a:rPr lang="el-GR" sz="1200" i="0" dirty="0">
                 <a:solidFill>
-                  <a:srgbClr val="202122"/>
+                  <a:srgbClr val="FF0000"/>
                 </a:solidFill>
                 <a:effectLst/>
               </a:rPr>
               <a:t> μ</a:t>
             </a:r>
             <a:r>
-              <a:rPr lang="en-CA" sz="1200" dirty="0"/>
+              <a:rPr lang="en-CA" sz="1200" dirty="0">
+                <a:solidFill>
+                  <a:srgbClr val="FF0000"/>
+                </a:solidFill>
+              </a:rPr>
               <a:t>m</a:t>
             </a:r>
           </a:p>
@@ -3450,7 +3549,7 @@
             <a:avLst/>
           </a:prstGeom>
           <a:solidFill>
-            <a:srgbClr val="BC1921"/>
+            <a:schemeClr val="bg1"/>
           </a:solidFill>
         </p:spPr>
         <p:txBody>
@@ -3460,20 +3559,28 @@
           <a:lstStyle/>
           <a:p>
             <a:r>
-              <a:rPr lang="en-CA" sz="1200" dirty="0"/>
+              <a:rPr lang="en-CA" sz="1200" dirty="0">
+                <a:solidFill>
+                  <a:srgbClr val="FF0000"/>
+                </a:solidFill>
+              </a:rPr>
               <a:t>Length:419.05 </a:t>
             </a:r>
             <a:r>
               <a:rPr lang="el-GR" sz="1200" i="0" dirty="0">
                 <a:solidFill>
-                  <a:srgbClr val="202122"/>
+                  <a:srgbClr val="FF0000"/>
                 </a:solidFill>
                 <a:effectLst/>
               </a:rPr>
               <a:t>μ</a:t>
             </a:r>
             <a:r>
-              <a:rPr lang="en-CA" sz="1200" dirty="0"/>
+              <a:rPr lang="en-CA" sz="1200" dirty="0">
+                <a:solidFill>
+                  <a:srgbClr val="FF0000"/>
+                </a:solidFill>
+              </a:rPr>
               <a:t>m</a:t>
             </a:r>
           </a:p>
@@ -3500,7 +3607,7 @@
             <a:avLst/>
           </a:prstGeom>
           <a:solidFill>
-            <a:srgbClr val="BC1921"/>
+            <a:schemeClr val="bg1"/>
           </a:solidFill>
         </p:spPr>
         <p:txBody>
@@ -3510,20 +3617,28 @@
           <a:lstStyle/>
           <a:p>
             <a:r>
-              <a:rPr lang="en-CA" sz="1200" dirty="0"/>
+              <a:rPr lang="en-CA" sz="1200" dirty="0">
+                <a:solidFill>
+                  <a:srgbClr val="FF0000"/>
+                </a:solidFill>
+              </a:rPr>
               <a:t>Length:488.38</a:t>
             </a:r>
             <a:r>
               <a:rPr lang="el-GR" sz="1200" i="0" dirty="0">
                 <a:solidFill>
-                  <a:srgbClr val="202122"/>
+                  <a:srgbClr val="FF0000"/>
                 </a:solidFill>
                 <a:effectLst/>
               </a:rPr>
               <a:t> μ</a:t>
             </a:r>
             <a:r>
-              <a:rPr lang="en-CA" sz="1200" dirty="0"/>
+              <a:rPr lang="en-CA" sz="1200" dirty="0">
+                <a:solidFill>
+                  <a:srgbClr val="FF0000"/>
+                </a:solidFill>
+              </a:rPr>
               <a:t>m</a:t>
             </a:r>
           </a:p>
@@ -3616,7 +3731,7 @@
             <a:avLst/>
           </a:prstGeom>
           <a:solidFill>
-            <a:srgbClr val="BC1921"/>
+            <a:schemeClr val="bg1"/>
           </a:solidFill>
         </p:spPr>
         <p:txBody>
@@ -3626,20 +3741,28 @@
           <a:lstStyle/>
           <a:p>
             <a:r>
-              <a:rPr lang="en-CA" sz="1200" dirty="0"/>
+              <a:rPr lang="en-CA" sz="1200" dirty="0">
+                <a:solidFill>
+                  <a:srgbClr val="C00000"/>
+                </a:solidFill>
+              </a:rPr>
               <a:t>Length:65.37 </a:t>
             </a:r>
             <a:r>
               <a:rPr lang="el-GR" sz="1200" i="0" dirty="0">
                 <a:solidFill>
-                  <a:srgbClr val="202122"/>
+                  <a:srgbClr val="C00000"/>
                 </a:solidFill>
                 <a:effectLst/>
               </a:rPr>
               <a:t> μ</a:t>
             </a:r>
             <a:r>
-              <a:rPr lang="en-CA" sz="1200" dirty="0"/>
+              <a:rPr lang="en-CA" sz="1200" dirty="0">
+                <a:solidFill>
+                  <a:srgbClr val="C00000"/>
+                </a:solidFill>
+              </a:rPr>
               <a:t>m</a:t>
             </a:r>
           </a:p>
@@ -3666,7 +3789,7 @@
             <a:avLst/>
           </a:prstGeom>
           <a:solidFill>
-            <a:srgbClr val="BC1921"/>
+            <a:schemeClr val="bg1"/>
           </a:solidFill>
         </p:spPr>
         <p:txBody>
@@ -3676,20 +3799,28 @@
           <a:lstStyle/>
           <a:p>
             <a:r>
-              <a:rPr lang="en-CA" sz="1200" dirty="0"/>
+              <a:rPr lang="en-CA" sz="1200" dirty="0">
+                <a:solidFill>
+                  <a:srgbClr val="C00000"/>
+                </a:solidFill>
+              </a:rPr>
               <a:t>Length:182.70 </a:t>
             </a:r>
             <a:r>
               <a:rPr lang="el-GR" sz="1200" i="0" dirty="0">
                 <a:solidFill>
-                  <a:srgbClr val="202122"/>
+                  <a:srgbClr val="C00000"/>
                 </a:solidFill>
                 <a:effectLst/>
               </a:rPr>
               <a:t> μ</a:t>
             </a:r>
             <a:r>
-              <a:rPr lang="en-CA" sz="1200" dirty="0"/>
+              <a:rPr lang="en-CA" sz="1200" dirty="0">
+                <a:solidFill>
+                  <a:srgbClr val="C00000"/>
+                </a:solidFill>
+              </a:rPr>
               <a:t>m</a:t>
             </a:r>
           </a:p>
@@ -3716,7 +3847,7 @@
             <a:avLst/>
           </a:prstGeom>
           <a:solidFill>
-            <a:srgbClr val="BC1921"/>
+            <a:schemeClr val="bg1"/>
           </a:solidFill>
         </p:spPr>
         <p:txBody>
@@ -3726,20 +3857,28 @@
           <a:lstStyle/>
           <a:p>
             <a:r>
-              <a:rPr lang="en-CA" sz="1200" dirty="0"/>
+              <a:rPr lang="en-CA" sz="1200" dirty="0">
+                <a:solidFill>
+                  <a:srgbClr val="C00000"/>
+                </a:solidFill>
+              </a:rPr>
               <a:t>Length:295.07 </a:t>
             </a:r>
             <a:r>
               <a:rPr lang="el-GR" sz="1200" i="0" dirty="0">
                 <a:solidFill>
-                  <a:srgbClr val="202122"/>
+                  <a:srgbClr val="C00000"/>
                 </a:solidFill>
                 <a:effectLst/>
               </a:rPr>
               <a:t> μ</a:t>
             </a:r>
             <a:r>
-              <a:rPr lang="en-CA" sz="1200" dirty="0"/>
+              <a:rPr lang="en-CA" sz="1200" dirty="0">
+                <a:solidFill>
+                  <a:srgbClr val="C00000"/>
+                </a:solidFill>
+              </a:rPr>
               <a:t>m</a:t>
             </a:r>
           </a:p>

</xml_diff>